<commit_message>
dev build 0.43 (bugfixes, licence/credits, more photos)
- Moved boss battle levels into their dungeons.
- More progress on the fat dungeon.
- Added some slides to the presentation.
- Added documents for licence and credits.
</commit_message>
<xml_diff>
--- a/Presentation.pptx
+++ b/Presentation.pptx
@@ -10,7 +10,10 @@
     <p:sldId id="258" r:id="rId4"/>
     <p:sldId id="259" r:id="rId5"/>
     <p:sldId id="260" r:id="rId6"/>
-    <p:sldId id="261" r:id="rId7"/>
+    <p:sldId id="262" r:id="rId7"/>
+    <p:sldId id="261" r:id="rId8"/>
+    <p:sldId id="263" r:id="rId9"/>
+    <p:sldId id="264" r:id="rId10"/>
   </p:sldIdLst>
   <p:sldSz cx="12192000" cy="6858000"/>
   <p:notesSz cx="6858000" cy="9144000"/>
@@ -109,6 +112,11 @@
       </a:defRPr>
     </a:lvl9pPr>
   </p:defaultTextStyle>
+  <p:extLst>
+    <p:ext uri="{EFAFB233-063F-42B5-8137-9DF3F51BA10A}">
+      <p15:sldGuideLst xmlns:p15="http://schemas.microsoft.com/office/powerpoint/2012/main"/>
+    </p:ext>
+  </p:extLst>
 </p:presentation>
 </file>
 
@@ -4607,8 +4615,8 @@
         </p:blipFill>
         <p:spPr>
           <a:xfrm>
-            <a:off x="1642124" y="4008582"/>
-            <a:ext cx="1105694" cy="1105694"/>
+            <a:off x="552233" y="2258609"/>
+            <a:ext cx="1821194" cy="1821194"/>
           </a:xfrm>
         </p:spPr>
       </p:pic>
@@ -4640,8 +4648,8 @@
         </p:blipFill>
         <p:spPr>
           <a:xfrm>
-            <a:off x="3526971" y="4180429"/>
-            <a:ext cx="3048000" cy="762000"/>
+            <a:off x="3132056" y="2672035"/>
+            <a:ext cx="4954588" cy="1238647"/>
           </a:xfrm>
           <a:prstGeom prst="rect">
             <a:avLst/>
@@ -4676,7 +4684,7 @@
         </p:blipFill>
         <p:spPr>
           <a:xfrm>
-            <a:off x="7049293" y="3004627"/>
+            <a:off x="6766090" y="365125"/>
             <a:ext cx="1003955" cy="2007910"/>
           </a:xfrm>
           <a:prstGeom prst="rect">
@@ -4712,7 +4720,7 @@
         </p:blipFill>
         <p:spPr>
           <a:xfrm>
-            <a:off x="1508288" y="2390839"/>
+            <a:off x="838200" y="1403956"/>
             <a:ext cx="4587712" cy="573464"/>
           </a:xfrm>
           <a:prstGeom prst="rect">
@@ -4748,8 +4756,44 @@
         </p:blipFill>
         <p:spPr>
           <a:xfrm>
-            <a:off x="8983457" y="4544932"/>
-            <a:ext cx="1542852" cy="385713"/>
+            <a:off x="161795" y="4508242"/>
+            <a:ext cx="4423264" cy="1105816"/>
+          </a:xfrm>
+          <a:prstGeom prst="rect">
+            <a:avLst/>
+          </a:prstGeom>
+        </p:spPr>
+      </p:pic>
+      <p:pic>
+        <p:nvPicPr>
+          <p:cNvPr id="4" name="Bilde 3" descr="Et bilde som inneholder Fargerikt, skjermbilde, lilla, mønster&#10;&#10;Automatisk generert beskrivelse">
+            <a:extLst>
+              <a:ext uri="{FF2B5EF4-FFF2-40B4-BE49-F238E27FC236}">
+                <a16:creationId xmlns:a16="http://schemas.microsoft.com/office/drawing/2014/main" id="{18B04B65-1EE5-F9C2-A7B1-DF3C20312D58}"/>
+              </a:ext>
+            </a:extLst>
+          </p:cNvPr>
+          <p:cNvPicPr>
+            <a:picLocks noChangeAspect="1"/>
+          </p:cNvPicPr>
+          <p:nvPr/>
+        </p:nvPicPr>
+        <p:blipFill>
+          <a:blip r:embed="rId7">
+            <a:extLst>
+              <a:ext uri="{28A0092B-C50C-407E-A947-70E740481C1C}">
+                <a14:useLocalDpi xmlns:a14="http://schemas.microsoft.com/office/drawing/2010/main" val="0"/>
+              </a:ext>
+            </a:extLst>
+          </a:blip>
+          <a:stretch>
+            <a:fillRect/>
+          </a:stretch>
+        </p:blipFill>
+        <p:spPr>
+          <a:xfrm>
+            <a:off x="8728683" y="186676"/>
+            <a:ext cx="3242324" cy="6484648"/>
           </a:xfrm>
           <a:prstGeom prst="rect">
             <a:avLst/>
@@ -4788,6 +4832,172 @@
       </p:grpSpPr>
       <p:sp>
         <p:nvSpPr>
+          <p:cNvPr id="2" name="Tittel 1">
+            <a:extLst>
+              <a:ext uri="{FF2B5EF4-FFF2-40B4-BE49-F238E27FC236}">
+                <a16:creationId xmlns:a16="http://schemas.microsoft.com/office/drawing/2014/main" id="{EB19BAAA-0956-A3F6-E973-8435F1D2C600}"/>
+              </a:ext>
+            </a:extLst>
+          </p:cNvPr>
+          <p:cNvSpPr>
+            <a:spLocks noGrp="1"/>
+          </p:cNvSpPr>
+          <p:nvPr>
+            <p:ph type="title"/>
+          </p:nvPr>
+        </p:nvSpPr>
+        <p:spPr/>
+        <p:txBody>
+          <a:bodyPr/>
+          <a:lstStyle/>
+          <a:p>
+            <a:r>
+              <a:rPr lang="nb-NO" dirty="0" err="1"/>
+              <a:t>Photographies</a:t>
+            </a:r>
+            <a:endParaRPr lang="nb-NO" dirty="0"/>
+          </a:p>
+        </p:txBody>
+      </p:sp>
+      <p:pic>
+        <p:nvPicPr>
+          <p:cNvPr id="5" name="Plassholder for innhold 4" descr="Et bilde som inneholder landskap, tre, utendørs, vann&#10;&#10;Automatisk generert beskrivelse">
+            <a:extLst>
+              <a:ext uri="{FF2B5EF4-FFF2-40B4-BE49-F238E27FC236}">
+                <a16:creationId xmlns:a16="http://schemas.microsoft.com/office/drawing/2014/main" id="{E7FFEAC6-F597-14FD-98BB-64011AACA243}"/>
+              </a:ext>
+            </a:extLst>
+          </p:cNvPr>
+          <p:cNvPicPr>
+            <a:picLocks noGrp="1" noChangeAspect="1"/>
+          </p:cNvPicPr>
+          <p:nvPr>
+            <p:ph idx="1"/>
+          </p:nvPr>
+        </p:nvPicPr>
+        <p:blipFill>
+          <a:blip r:embed="rId2">
+            <a:extLst>
+              <a:ext uri="{28A0092B-C50C-407E-A947-70E740481C1C}">
+                <a14:useLocalDpi xmlns:a14="http://schemas.microsoft.com/office/drawing/2010/main" val="0"/>
+              </a:ext>
+            </a:extLst>
+          </a:blip>
+          <a:stretch>
+            <a:fillRect/>
+          </a:stretch>
+        </p:blipFill>
+        <p:spPr>
+          <a:xfrm>
+            <a:off x="4212717" y="2232025"/>
+            <a:ext cx="7719729" cy="4351338"/>
+          </a:xfrm>
+        </p:spPr>
+      </p:pic>
+      <p:pic>
+        <p:nvPicPr>
+          <p:cNvPr id="7" name="Bilde 6" descr="Et bilde som inneholder piksel, symbol, Grafikk, design&#10;&#10;Automatisk generert beskrivelse">
+            <a:extLst>
+              <a:ext uri="{FF2B5EF4-FFF2-40B4-BE49-F238E27FC236}">
+                <a16:creationId xmlns:a16="http://schemas.microsoft.com/office/drawing/2014/main" id="{EFA017E3-A5FC-301C-EC5C-A74EEDD49023}"/>
+              </a:ext>
+            </a:extLst>
+          </p:cNvPr>
+          <p:cNvPicPr>
+            <a:picLocks noChangeAspect="1"/>
+          </p:cNvPicPr>
+          <p:nvPr/>
+        </p:nvPicPr>
+        <p:blipFill>
+          <a:blip r:embed="rId3">
+            <a:extLst>
+              <a:ext uri="{28A0092B-C50C-407E-A947-70E740481C1C}">
+                <a14:useLocalDpi xmlns:a14="http://schemas.microsoft.com/office/drawing/2010/main" val="0"/>
+              </a:ext>
+            </a:extLst>
+          </a:blip>
+          <a:stretch>
+            <a:fillRect/>
+          </a:stretch>
+        </p:blipFill>
+        <p:spPr>
+          <a:xfrm>
+            <a:off x="471712" y="2232025"/>
+            <a:ext cx="2991267" cy="3010320"/>
+          </a:xfrm>
+          <a:prstGeom prst="rect">
+            <a:avLst/>
+          </a:prstGeom>
+        </p:spPr>
+      </p:pic>
+    </p:spTree>
+    <p:extLst>
+      <p:ext uri="{BB962C8B-B14F-4D97-AF65-F5344CB8AC3E}">
+        <p14:creationId xmlns:p14="http://schemas.microsoft.com/office/powerpoint/2010/main" val="3408268536"/>
+      </p:ext>
+    </p:extLst>
+  </p:cSld>
+  <p:clrMapOvr>
+    <a:masterClrMapping/>
+  </p:clrMapOvr>
+</p:sld>
+</file>
+
+<file path=ppt/slides/slide7.xml><?xml version="1.0" encoding="utf-8"?>
+<p:sld xmlns:a="http://schemas.openxmlformats.org/drawingml/2006/main" xmlns:r="http://schemas.openxmlformats.org/officeDocument/2006/relationships" xmlns:p="http://schemas.openxmlformats.org/presentationml/2006/main">
+  <p:cSld>
+    <p:spTree>
+      <p:nvGrpSpPr>
+        <p:cNvPr id="1" name=""/>
+        <p:cNvGrpSpPr/>
+        <p:nvPr/>
+      </p:nvGrpSpPr>
+      <p:grpSpPr>
+        <a:xfrm>
+          <a:off x="0" y="0"/>
+          <a:ext cx="0" cy="0"/>
+          <a:chOff x="0" y="0"/>
+          <a:chExt cx="0" cy="0"/>
+        </a:xfrm>
+      </p:grpSpPr>
+      <p:pic>
+        <p:nvPicPr>
+          <p:cNvPr id="7" name="Bilde 6" descr="Et bilde som inneholder diagram&#10;&#10;Automatisk generert beskrivelse">
+            <a:extLst>
+              <a:ext uri="{FF2B5EF4-FFF2-40B4-BE49-F238E27FC236}">
+                <a16:creationId xmlns:a16="http://schemas.microsoft.com/office/drawing/2014/main" id="{FF7126F0-2135-CA9C-D2DF-D32724652FBE}"/>
+              </a:ext>
+            </a:extLst>
+          </p:cNvPr>
+          <p:cNvPicPr>
+            <a:picLocks noChangeAspect="1"/>
+          </p:cNvPicPr>
+          <p:nvPr/>
+        </p:nvPicPr>
+        <p:blipFill>
+          <a:blip r:embed="rId2">
+            <a:extLst>
+              <a:ext uri="{28A0092B-C50C-407E-A947-70E740481C1C}">
+                <a14:useLocalDpi xmlns:a14="http://schemas.microsoft.com/office/drawing/2010/main" val="0"/>
+              </a:ext>
+            </a:extLst>
+          </a:blip>
+          <a:stretch>
+            <a:fillRect/>
+          </a:stretch>
+        </p:blipFill>
+        <p:spPr>
+          <a:xfrm>
+            <a:off x="221671" y="2592847"/>
+            <a:ext cx="9282547" cy="4123334"/>
+          </a:xfrm>
+          <a:prstGeom prst="rect">
+            <a:avLst/>
+          </a:prstGeom>
+        </p:spPr>
+      </p:pic>
+      <p:sp>
+        <p:nvSpPr>
           <p:cNvPr id="2" name="Title 1">
             <a:extLst>
               <a:ext uri="{FF2B5EF4-FFF2-40B4-BE49-F238E27FC236}">
@@ -4807,32 +5017,95 @@
           <a:bodyPr/>
           <a:lstStyle/>
           <a:p>
-            <a:endParaRPr lang="en-NZ"/>
-          </a:p>
-        </p:txBody>
-      </p:sp>
-      <p:sp>
-        <p:nvSpPr>
-          <p:cNvPr id="3" name="Content Placeholder 2">
-            <a:extLst>
-              <a:ext uri="{FF2B5EF4-FFF2-40B4-BE49-F238E27FC236}">
-                <a16:creationId xmlns:a16="http://schemas.microsoft.com/office/drawing/2014/main" id="{B6088B4B-5FD1-A07E-69E4-55143F69D08C}"/>
-              </a:ext>
-            </a:extLst>
-          </p:cNvPr>
-          <p:cNvSpPr>
-            <a:spLocks noGrp="1"/>
-          </p:cNvSpPr>
+            <a:r>
+              <a:rPr lang="en-NZ" dirty="0"/>
+              <a:t>Music</a:t>
+            </a:r>
+          </a:p>
+        </p:txBody>
+      </p:sp>
+      <p:pic>
+        <p:nvPicPr>
+          <p:cNvPr id="5" name="Plassholder for innhold 4">
+            <a:extLst>
+              <a:ext uri="{FF2B5EF4-FFF2-40B4-BE49-F238E27FC236}">
+                <a16:creationId xmlns:a16="http://schemas.microsoft.com/office/drawing/2014/main" id="{96DA95F9-5B16-B4EB-2E03-52558DAEBD4F}"/>
+              </a:ext>
+            </a:extLst>
+          </p:cNvPr>
+          <p:cNvPicPr>
+            <a:picLocks noGrp="1" noChangeAspect="1"/>
+          </p:cNvPicPr>
           <p:nvPr>
             <p:ph idx="1"/>
           </p:nvPr>
-        </p:nvSpPr>
-        <p:spPr/>
-        <p:txBody>
-          <a:bodyPr/>
-          <a:lstStyle/>
-          <a:p>
-            <a:endParaRPr lang="en-NZ"/>
+        </p:nvPicPr>
+        <p:blipFill>
+          <a:blip r:embed="rId3">
+            <a:extLst>
+              <a:ext uri="{28A0092B-C50C-407E-A947-70E740481C1C}">
+                <a14:useLocalDpi xmlns:a14="http://schemas.microsoft.com/office/drawing/2010/main" val="0"/>
+              </a:ext>
+            </a:extLst>
+          </a:blip>
+          <a:srcRect/>
+          <a:stretch/>
+        </p:blipFill>
+        <p:spPr>
+          <a:xfrm>
+            <a:off x="4915805" y="382074"/>
+            <a:ext cx="7054524" cy="4241532"/>
+          </a:xfrm>
+        </p:spPr>
+      </p:pic>
+      <p:sp>
+        <p:nvSpPr>
+          <p:cNvPr id="8" name="TekstSylinder 7">
+            <a:extLst>
+              <a:ext uri="{FF2B5EF4-FFF2-40B4-BE49-F238E27FC236}">
+                <a16:creationId xmlns:a16="http://schemas.microsoft.com/office/drawing/2014/main" id="{4E0C4A78-A4C9-DC76-3009-1FCB7DAE2915}"/>
+              </a:ext>
+            </a:extLst>
+          </p:cNvPr>
+          <p:cNvSpPr txBox="1"/>
+          <p:nvPr/>
+        </p:nvSpPr>
+        <p:spPr>
+          <a:xfrm>
+            <a:off x="997527" y="1856509"/>
+            <a:ext cx="2946400" cy="646331"/>
+          </a:xfrm>
+          <a:prstGeom prst="rect">
+            <a:avLst/>
+          </a:prstGeom>
+          <a:noFill/>
+        </p:spPr>
+        <p:txBody>
+          <a:bodyPr wrap="square" rtlCol="0">
+            <a:spAutoFit/>
+          </a:bodyPr>
+          <a:lstStyle/>
+          <a:p>
+            <a:pPr marL="285750" indent="-285750">
+              <a:buFont typeface="Arial" panose="020B0604020202020204" pitchFamily="34" charset="0"/>
+              <a:buChar char="•"/>
+            </a:pPr>
+            <a:r>
+              <a:rPr lang="nb-NO" dirty="0" err="1"/>
+              <a:t>MilkyTracker</a:t>
+            </a:r>
+            <a:endParaRPr lang="nb-NO" dirty="0"/>
+          </a:p>
+          <a:p>
+            <a:pPr marL="285750" indent="-285750">
+              <a:buFont typeface="Arial" panose="020B0604020202020204" pitchFamily="34" charset="0"/>
+              <a:buChar char="•"/>
+            </a:pPr>
+            <a:r>
+              <a:rPr lang="nb-NO" dirty="0" err="1"/>
+              <a:t>MuseScore</a:t>
+            </a:r>
+            <a:endParaRPr lang="nb-NO" dirty="0"/>
           </a:p>
         </p:txBody>
       </p:sp>
@@ -4840,6 +5113,166 @@
     <p:extLst>
       <p:ext uri="{BB962C8B-B14F-4D97-AF65-F5344CB8AC3E}">
         <p14:creationId xmlns:p14="http://schemas.microsoft.com/office/powerpoint/2010/main" val="675213407"/>
+      </p:ext>
+    </p:extLst>
+  </p:cSld>
+  <p:clrMapOvr>
+    <a:masterClrMapping/>
+  </p:clrMapOvr>
+</p:sld>
+</file>
+
+<file path=ppt/slides/slide8.xml><?xml version="1.0" encoding="utf-8"?>
+<p:sld xmlns:a="http://schemas.openxmlformats.org/drawingml/2006/main" xmlns:r="http://schemas.openxmlformats.org/officeDocument/2006/relationships" xmlns:p="http://schemas.openxmlformats.org/presentationml/2006/main">
+  <p:cSld>
+    <p:spTree>
+      <p:nvGrpSpPr>
+        <p:cNvPr id="1" name=""/>
+        <p:cNvGrpSpPr/>
+        <p:nvPr/>
+      </p:nvGrpSpPr>
+      <p:grpSpPr>
+        <a:xfrm>
+          <a:off x="0" y="0"/>
+          <a:ext cx="0" cy="0"/>
+          <a:chOff x="0" y="0"/>
+          <a:chExt cx="0" cy="0"/>
+        </a:xfrm>
+      </p:grpSpPr>
+      <p:sp>
+        <p:nvSpPr>
+          <p:cNvPr id="2" name="Tittel 1">
+            <a:extLst>
+              <a:ext uri="{FF2B5EF4-FFF2-40B4-BE49-F238E27FC236}">
+                <a16:creationId xmlns:a16="http://schemas.microsoft.com/office/drawing/2014/main" id="{D4453377-5672-4E29-B69E-362BD1F075D9}"/>
+              </a:ext>
+            </a:extLst>
+          </p:cNvPr>
+          <p:cNvSpPr>
+            <a:spLocks noGrp="1"/>
+          </p:cNvSpPr>
+          <p:nvPr>
+            <p:ph type="title"/>
+          </p:nvPr>
+        </p:nvSpPr>
+        <p:spPr/>
+        <p:txBody>
+          <a:bodyPr/>
+          <a:lstStyle/>
+          <a:p>
+            <a:endParaRPr lang="nb-NO"/>
+          </a:p>
+        </p:txBody>
+      </p:sp>
+      <p:sp>
+        <p:nvSpPr>
+          <p:cNvPr id="3" name="Plassholder for innhold 2">
+            <a:extLst>
+              <a:ext uri="{FF2B5EF4-FFF2-40B4-BE49-F238E27FC236}">
+                <a16:creationId xmlns:a16="http://schemas.microsoft.com/office/drawing/2014/main" id="{6BCA5308-0FC3-3316-A8DD-4DADFA6450EA}"/>
+              </a:ext>
+            </a:extLst>
+          </p:cNvPr>
+          <p:cNvSpPr>
+            <a:spLocks noGrp="1"/>
+          </p:cNvSpPr>
+          <p:nvPr>
+            <p:ph idx="1"/>
+          </p:nvPr>
+        </p:nvSpPr>
+        <p:spPr/>
+        <p:txBody>
+          <a:bodyPr/>
+          <a:lstStyle/>
+          <a:p>
+            <a:endParaRPr lang="nb-NO"/>
+          </a:p>
+        </p:txBody>
+      </p:sp>
+    </p:spTree>
+    <p:extLst>
+      <p:ext uri="{BB962C8B-B14F-4D97-AF65-F5344CB8AC3E}">
+        <p14:creationId xmlns:p14="http://schemas.microsoft.com/office/powerpoint/2010/main" val="1946054159"/>
+      </p:ext>
+    </p:extLst>
+  </p:cSld>
+  <p:clrMapOvr>
+    <a:masterClrMapping/>
+  </p:clrMapOvr>
+</p:sld>
+</file>
+
+<file path=ppt/slides/slide9.xml><?xml version="1.0" encoding="utf-8"?>
+<p:sld xmlns:a="http://schemas.openxmlformats.org/drawingml/2006/main" xmlns:r="http://schemas.openxmlformats.org/officeDocument/2006/relationships" xmlns:p="http://schemas.openxmlformats.org/presentationml/2006/main">
+  <p:cSld>
+    <p:spTree>
+      <p:nvGrpSpPr>
+        <p:cNvPr id="1" name=""/>
+        <p:cNvGrpSpPr/>
+        <p:nvPr/>
+      </p:nvGrpSpPr>
+      <p:grpSpPr>
+        <a:xfrm>
+          <a:off x="0" y="0"/>
+          <a:ext cx="0" cy="0"/>
+          <a:chOff x="0" y="0"/>
+          <a:chExt cx="0" cy="0"/>
+        </a:xfrm>
+      </p:grpSpPr>
+      <p:sp>
+        <p:nvSpPr>
+          <p:cNvPr id="2" name="Tittel 1">
+            <a:extLst>
+              <a:ext uri="{FF2B5EF4-FFF2-40B4-BE49-F238E27FC236}">
+                <a16:creationId xmlns:a16="http://schemas.microsoft.com/office/drawing/2014/main" id="{D4453377-5672-4E29-B69E-362BD1F075D9}"/>
+              </a:ext>
+            </a:extLst>
+          </p:cNvPr>
+          <p:cNvSpPr>
+            <a:spLocks noGrp="1"/>
+          </p:cNvSpPr>
+          <p:nvPr>
+            <p:ph type="title"/>
+          </p:nvPr>
+        </p:nvSpPr>
+        <p:spPr/>
+        <p:txBody>
+          <a:bodyPr/>
+          <a:lstStyle/>
+          <a:p>
+            <a:endParaRPr lang="nb-NO"/>
+          </a:p>
+        </p:txBody>
+      </p:sp>
+      <p:sp>
+        <p:nvSpPr>
+          <p:cNvPr id="3" name="Plassholder for innhold 2">
+            <a:extLst>
+              <a:ext uri="{FF2B5EF4-FFF2-40B4-BE49-F238E27FC236}">
+                <a16:creationId xmlns:a16="http://schemas.microsoft.com/office/drawing/2014/main" id="{6BCA5308-0FC3-3316-A8DD-4DADFA6450EA}"/>
+              </a:ext>
+            </a:extLst>
+          </p:cNvPr>
+          <p:cNvSpPr>
+            <a:spLocks noGrp="1"/>
+          </p:cNvSpPr>
+          <p:nvPr>
+            <p:ph idx="1"/>
+          </p:nvPr>
+        </p:nvSpPr>
+        <p:spPr/>
+        <p:txBody>
+          <a:bodyPr/>
+          <a:lstStyle/>
+          <a:p>
+            <a:endParaRPr lang="nb-NO"/>
+          </a:p>
+        </p:txBody>
+      </p:sp>
+    </p:spTree>
+    <p:extLst>
+      <p:ext uri="{BB962C8B-B14F-4D97-AF65-F5344CB8AC3E}">
+        <p14:creationId xmlns:p14="http://schemas.microsoft.com/office/powerpoint/2010/main" val="530611003"/>
       </p:ext>
     </p:extLst>
   </p:cSld>

</xml_diff>